<commit_message>
segunda capacitacion php puro ago 22
</commit_message>
<xml_diff>
--- a/presentacion/Presentación1.pptx
+++ b/presentacion/Presentación1.pptx
@@ -109,6 +109,11 @@
       </a:defRPr>
     </a:lvl9pPr>
   </p:defaultTextStyle>
+  <p:extLst>
+    <p:ext uri="{EFAFB233-063F-42B5-8137-9DF3F51BA10A}">
+      <p15:sldGuideLst xmlns:p15="http://schemas.microsoft.com/office/powerpoint/2012/main"/>
+    </p:ext>
+  </p:extLst>
 </p:presentation>
 </file>
 
@@ -261,7 +266,7 @@
           <a:p>
             <a:fld id="{F1FFD307-C115-43E9-8A18-D57EFF9A5356}" type="datetimeFigureOut">
               <a:rPr lang="es-MX" smtClean="0"/>
-              <a:t>16/08/2022</a:t>
+              <a:t>17/08/2022</a:t>
             </a:fld>
             <a:endParaRPr lang="es-MX"/>
           </a:p>
@@ -461,7 +466,7 @@
           <a:p>
             <a:fld id="{F1FFD307-C115-43E9-8A18-D57EFF9A5356}" type="datetimeFigureOut">
               <a:rPr lang="es-MX" smtClean="0"/>
-              <a:t>16/08/2022</a:t>
+              <a:t>17/08/2022</a:t>
             </a:fld>
             <a:endParaRPr lang="es-MX"/>
           </a:p>
@@ -671,7 +676,7 @@
           <a:p>
             <a:fld id="{F1FFD307-C115-43E9-8A18-D57EFF9A5356}" type="datetimeFigureOut">
               <a:rPr lang="es-MX" smtClean="0"/>
-              <a:t>16/08/2022</a:t>
+              <a:t>17/08/2022</a:t>
             </a:fld>
             <a:endParaRPr lang="es-MX"/>
           </a:p>
@@ -871,7 +876,7 @@
           <a:p>
             <a:fld id="{F1FFD307-C115-43E9-8A18-D57EFF9A5356}" type="datetimeFigureOut">
               <a:rPr lang="es-MX" smtClean="0"/>
-              <a:t>16/08/2022</a:t>
+              <a:t>17/08/2022</a:t>
             </a:fld>
             <a:endParaRPr lang="es-MX"/>
           </a:p>
@@ -1147,7 +1152,7 @@
           <a:p>
             <a:fld id="{F1FFD307-C115-43E9-8A18-D57EFF9A5356}" type="datetimeFigureOut">
               <a:rPr lang="es-MX" smtClean="0"/>
-              <a:t>16/08/2022</a:t>
+              <a:t>17/08/2022</a:t>
             </a:fld>
             <a:endParaRPr lang="es-MX"/>
           </a:p>
@@ -1415,7 +1420,7 @@
           <a:p>
             <a:fld id="{F1FFD307-C115-43E9-8A18-D57EFF9A5356}" type="datetimeFigureOut">
               <a:rPr lang="es-MX" smtClean="0"/>
-              <a:t>16/08/2022</a:t>
+              <a:t>17/08/2022</a:t>
             </a:fld>
             <a:endParaRPr lang="es-MX"/>
           </a:p>
@@ -1830,7 +1835,7 @@
           <a:p>
             <a:fld id="{F1FFD307-C115-43E9-8A18-D57EFF9A5356}" type="datetimeFigureOut">
               <a:rPr lang="es-MX" smtClean="0"/>
-              <a:t>16/08/2022</a:t>
+              <a:t>17/08/2022</a:t>
             </a:fld>
             <a:endParaRPr lang="es-MX"/>
           </a:p>
@@ -1972,7 +1977,7 @@
           <a:p>
             <a:fld id="{F1FFD307-C115-43E9-8A18-D57EFF9A5356}" type="datetimeFigureOut">
               <a:rPr lang="es-MX" smtClean="0"/>
-              <a:t>16/08/2022</a:t>
+              <a:t>17/08/2022</a:t>
             </a:fld>
             <a:endParaRPr lang="es-MX"/>
           </a:p>
@@ -2085,7 +2090,7 @@
           <a:p>
             <a:fld id="{F1FFD307-C115-43E9-8A18-D57EFF9A5356}" type="datetimeFigureOut">
               <a:rPr lang="es-MX" smtClean="0"/>
-              <a:t>16/08/2022</a:t>
+              <a:t>17/08/2022</a:t>
             </a:fld>
             <a:endParaRPr lang="es-MX"/>
           </a:p>
@@ -2398,7 +2403,7 @@
           <a:p>
             <a:fld id="{F1FFD307-C115-43E9-8A18-D57EFF9A5356}" type="datetimeFigureOut">
               <a:rPr lang="es-MX" smtClean="0"/>
-              <a:t>16/08/2022</a:t>
+              <a:t>17/08/2022</a:t>
             </a:fld>
             <a:endParaRPr lang="es-MX"/>
           </a:p>
@@ -2687,7 +2692,7 @@
           <a:p>
             <a:fld id="{F1FFD307-C115-43E9-8A18-D57EFF9A5356}" type="datetimeFigureOut">
               <a:rPr lang="es-MX" smtClean="0"/>
-              <a:t>16/08/2022</a:t>
+              <a:t>17/08/2022</a:t>
             </a:fld>
             <a:endParaRPr lang="es-MX"/>
           </a:p>
@@ -2930,7 +2935,7 @@
           <a:p>
             <a:fld id="{F1FFD307-C115-43E9-8A18-D57EFF9A5356}" type="datetimeFigureOut">
               <a:rPr lang="es-MX" smtClean="0"/>
-              <a:t>16/08/2022</a:t>
+              <a:t>17/08/2022</a:t>
             </a:fld>
             <a:endParaRPr lang="es-MX"/>
           </a:p>
@@ -4733,6 +4738,55 @@
           </a:p>
         </p:txBody>
       </p:sp>
+      <p:sp>
+        <p:nvSpPr>
+          <p:cNvPr id="2" name="Rectángulo: esquinas redondeadas 1">
+            <a:extLst>
+              <a:ext uri="{FF2B5EF4-FFF2-40B4-BE49-F238E27FC236}">
+                <a16:creationId xmlns:a16="http://schemas.microsoft.com/office/drawing/2014/main" id="{139AB47D-6DED-B491-DED6-3A4FE0D12561}"/>
+              </a:ext>
+            </a:extLst>
+          </p:cNvPr>
+          <p:cNvSpPr/>
+          <p:nvPr/>
+        </p:nvSpPr>
+        <p:spPr>
+          <a:xfrm>
+            <a:off x="9507559" y="1794253"/>
+            <a:ext cx="1683026" cy="437321"/>
+          </a:xfrm>
+          <a:prstGeom prst="roundRect">
+            <a:avLst/>
+          </a:prstGeom>
+        </p:spPr>
+        <p:style>
+          <a:lnRef idx="2">
+            <a:schemeClr val="accent6">
+              <a:shade val="50000"/>
+            </a:schemeClr>
+          </a:lnRef>
+          <a:fillRef idx="1">
+            <a:schemeClr val="accent6"/>
+          </a:fillRef>
+          <a:effectRef idx="0">
+            <a:schemeClr val="accent6"/>
+          </a:effectRef>
+          <a:fontRef idx="minor">
+            <a:schemeClr val="lt1"/>
+          </a:fontRef>
+        </p:style>
+        <p:txBody>
+          <a:bodyPr rtlCol="0" anchor="ctr"/>
+          <a:lstStyle/>
+          <a:p>
+            <a:pPr algn="ctr"/>
+            <a:r>
+              <a:rPr lang="es-MX" dirty="0"/>
+              <a:t>buscar</a:t>
+            </a:r>
+          </a:p>
+        </p:txBody>
+      </p:sp>
     </p:spTree>
     <p:extLst>
       <p:ext uri="{BB962C8B-B14F-4D97-AF65-F5344CB8AC3E}">
@@ -5843,34 +5897,68 @@
           <a:lstStyle/>
           <a:p>
             <a:r>
+              <a:rPr lang="es-MX" dirty="0">
+                <a:solidFill>
+                  <a:srgbClr val="FF0000"/>
+                </a:solidFill>
+              </a:rPr>
+              <a:t>Cuales son los proveedores, o cuales son los servidores que existen: ejemplo apache</a:t>
+            </a:r>
+          </a:p>
+          <a:p>
+            <a:r>
+              <a:rPr lang="es-MX" dirty="0">
+                <a:solidFill>
+                  <a:srgbClr val="FF0000"/>
+                </a:solidFill>
+              </a:rPr>
+              <a:t>Investigar el concepto de API REST</a:t>
+            </a:r>
+          </a:p>
+          <a:p>
+            <a:r>
+              <a:rPr lang="es-MX" dirty="0">
+                <a:solidFill>
+                  <a:srgbClr val="FF0000"/>
+                </a:solidFill>
+              </a:rPr>
+              <a:t>Investigar las peticiones HTTP, investiguen los códigos de respuesta del servidor.</a:t>
+            </a:r>
+          </a:p>
+          <a:p>
+            <a:r>
+              <a:rPr lang="es-MX" dirty="0">
+                <a:solidFill>
+                  <a:srgbClr val="FF0000"/>
+                </a:solidFill>
+              </a:rPr>
+              <a:t>Investigar Bootstrap e inyectarlo a un html, </a:t>
+            </a:r>
+            <a:r>
+              <a:rPr lang="es-MX" dirty="0" err="1">
+                <a:solidFill>
+                  <a:srgbClr val="FF0000"/>
+                </a:solidFill>
+              </a:rPr>
+              <a:t>jquery</a:t>
+            </a:r>
+            <a:r>
+              <a:rPr lang="es-MX" dirty="0">
+                <a:solidFill>
+                  <a:srgbClr val="FF0000"/>
+                </a:solidFill>
+              </a:rPr>
+              <a:t> framework de JS</a:t>
+            </a:r>
+          </a:p>
+          <a:p>
+            <a:r>
               <a:rPr lang="es-MX" dirty="0"/>
-              <a:t>Cuales son los proveedores, o cuales son los servidores que existen: ejemplo apache</a:t>
-            </a:r>
-          </a:p>
-          <a:p>
-            <a:r>
-              <a:rPr lang="es-MX" dirty="0"/>
-              <a:t>Investigar el concepto de API REST</a:t>
-            </a:r>
-          </a:p>
-          <a:p>
-            <a:r>
-              <a:rPr lang="es-MX" dirty="0"/>
-              <a:t>Investigar las peticiones HTTP, investiguen los códigos de respuesta del servidor.</a:t>
-            </a:r>
-          </a:p>
-          <a:p>
-            <a:r>
-              <a:rPr lang="es-MX" dirty="0"/>
-              <a:t>Investigar Bootstrap e inyectarlo a un html, </a:t>
-            </a:r>
-            <a:r>
-              <a:rPr lang="es-MX" dirty="0" err="1"/>
-              <a:t>jquery</a:t>
+              <a:t>Investigar funciones </a:t>
             </a:r>
             <a:r>
               <a:rPr lang="es-MX"/>
-              <a:t> framework de JS</a:t>
+              <a:t>anonimas</a:t>
             </a:r>
             <a:endParaRPr lang="es-MX" dirty="0"/>
           </a:p>

</xml_diff>

<commit_message>
tercera capacitacion de php puro ago 22
</commit_message>
<xml_diff>
--- a/presentacion/Presentación1.pptx
+++ b/presentacion/Presentación1.pptx
@@ -10,7 +10,9 @@
     <p:sldId id="259" r:id="rId4"/>
     <p:sldId id="260" r:id="rId5"/>
     <p:sldId id="261" r:id="rId6"/>
-    <p:sldId id="258" r:id="rId7"/>
+    <p:sldId id="262" r:id="rId7"/>
+    <p:sldId id="263" r:id="rId8"/>
+    <p:sldId id="258" r:id="rId9"/>
   </p:sldIdLst>
   <p:sldSz cx="12192000" cy="6858000"/>
   <p:notesSz cx="6858000" cy="9144000"/>
@@ -266,7 +268,7 @@
           <a:p>
             <a:fld id="{F1FFD307-C115-43E9-8A18-D57EFF9A5356}" type="datetimeFigureOut">
               <a:rPr lang="es-MX" smtClean="0"/>
-              <a:t>17/08/2022</a:t>
+              <a:t>18/08/2022</a:t>
             </a:fld>
             <a:endParaRPr lang="es-MX"/>
           </a:p>
@@ -466,7 +468,7 @@
           <a:p>
             <a:fld id="{F1FFD307-C115-43E9-8A18-D57EFF9A5356}" type="datetimeFigureOut">
               <a:rPr lang="es-MX" smtClean="0"/>
-              <a:t>17/08/2022</a:t>
+              <a:t>18/08/2022</a:t>
             </a:fld>
             <a:endParaRPr lang="es-MX"/>
           </a:p>
@@ -676,7 +678,7 @@
           <a:p>
             <a:fld id="{F1FFD307-C115-43E9-8A18-D57EFF9A5356}" type="datetimeFigureOut">
               <a:rPr lang="es-MX" smtClean="0"/>
-              <a:t>17/08/2022</a:t>
+              <a:t>18/08/2022</a:t>
             </a:fld>
             <a:endParaRPr lang="es-MX"/>
           </a:p>
@@ -876,7 +878,7 @@
           <a:p>
             <a:fld id="{F1FFD307-C115-43E9-8A18-D57EFF9A5356}" type="datetimeFigureOut">
               <a:rPr lang="es-MX" smtClean="0"/>
-              <a:t>17/08/2022</a:t>
+              <a:t>18/08/2022</a:t>
             </a:fld>
             <a:endParaRPr lang="es-MX"/>
           </a:p>
@@ -1152,7 +1154,7 @@
           <a:p>
             <a:fld id="{F1FFD307-C115-43E9-8A18-D57EFF9A5356}" type="datetimeFigureOut">
               <a:rPr lang="es-MX" smtClean="0"/>
-              <a:t>17/08/2022</a:t>
+              <a:t>18/08/2022</a:t>
             </a:fld>
             <a:endParaRPr lang="es-MX"/>
           </a:p>
@@ -1420,7 +1422,7 @@
           <a:p>
             <a:fld id="{F1FFD307-C115-43E9-8A18-D57EFF9A5356}" type="datetimeFigureOut">
               <a:rPr lang="es-MX" smtClean="0"/>
-              <a:t>17/08/2022</a:t>
+              <a:t>18/08/2022</a:t>
             </a:fld>
             <a:endParaRPr lang="es-MX"/>
           </a:p>
@@ -1835,7 +1837,7 @@
           <a:p>
             <a:fld id="{F1FFD307-C115-43E9-8A18-D57EFF9A5356}" type="datetimeFigureOut">
               <a:rPr lang="es-MX" smtClean="0"/>
-              <a:t>17/08/2022</a:t>
+              <a:t>18/08/2022</a:t>
             </a:fld>
             <a:endParaRPr lang="es-MX"/>
           </a:p>
@@ -1977,7 +1979,7 @@
           <a:p>
             <a:fld id="{F1FFD307-C115-43E9-8A18-D57EFF9A5356}" type="datetimeFigureOut">
               <a:rPr lang="es-MX" smtClean="0"/>
-              <a:t>17/08/2022</a:t>
+              <a:t>18/08/2022</a:t>
             </a:fld>
             <a:endParaRPr lang="es-MX"/>
           </a:p>
@@ -2090,7 +2092,7 @@
           <a:p>
             <a:fld id="{F1FFD307-C115-43E9-8A18-D57EFF9A5356}" type="datetimeFigureOut">
               <a:rPr lang="es-MX" smtClean="0"/>
-              <a:t>17/08/2022</a:t>
+              <a:t>18/08/2022</a:t>
             </a:fld>
             <a:endParaRPr lang="es-MX"/>
           </a:p>
@@ -2403,7 +2405,7 @@
           <a:p>
             <a:fld id="{F1FFD307-C115-43E9-8A18-D57EFF9A5356}" type="datetimeFigureOut">
               <a:rPr lang="es-MX" smtClean="0"/>
-              <a:t>17/08/2022</a:t>
+              <a:t>18/08/2022</a:t>
             </a:fld>
             <a:endParaRPr lang="es-MX"/>
           </a:p>
@@ -2692,7 +2694,7 @@
           <a:p>
             <a:fld id="{F1FFD307-C115-43E9-8A18-D57EFF9A5356}" type="datetimeFigureOut">
               <a:rPr lang="es-MX" smtClean="0"/>
-              <a:t>17/08/2022</a:t>
+              <a:t>18/08/2022</a:t>
             </a:fld>
             <a:endParaRPr lang="es-MX"/>
           </a:p>
@@ -2935,7 +2937,7 @@
           <a:p>
             <a:fld id="{F1FFD307-C115-43E9-8A18-D57EFF9A5356}" type="datetimeFigureOut">
               <a:rPr lang="es-MX" smtClean="0"/>
-              <a:t>17/08/2022</a:t>
+              <a:t>18/08/2022</a:t>
             </a:fld>
             <a:endParaRPr lang="es-MX"/>
           </a:p>
@@ -5852,6 +5854,506 @@
           <p:cNvPr id="2" name="Título 1">
             <a:extLst>
               <a:ext uri="{FF2B5EF4-FFF2-40B4-BE49-F238E27FC236}">
+                <a16:creationId xmlns:a16="http://schemas.microsoft.com/office/drawing/2014/main" id="{CED15607-4DFD-7CF8-3CC9-80AECDD9A616}"/>
+              </a:ext>
+            </a:extLst>
+          </p:cNvPr>
+          <p:cNvSpPr>
+            <a:spLocks noGrp="1"/>
+          </p:cNvSpPr>
+          <p:nvPr>
+            <p:ph type="title"/>
+          </p:nvPr>
+        </p:nvSpPr>
+        <p:spPr/>
+        <p:txBody>
+          <a:bodyPr/>
+          <a:lstStyle/>
+          <a:p>
+            <a:r>
+              <a:rPr lang="es-MX" dirty="0"/>
+              <a:t>Backend – MVC Lógica, validaciones, ABD, delegación de peticiones,…</a:t>
+            </a:r>
+          </a:p>
+        </p:txBody>
+      </p:sp>
+      <p:sp>
+        <p:nvSpPr>
+          <p:cNvPr id="3" name="Marcador de contenido 2">
+            <a:extLst>
+              <a:ext uri="{FF2B5EF4-FFF2-40B4-BE49-F238E27FC236}">
+                <a16:creationId xmlns:a16="http://schemas.microsoft.com/office/drawing/2014/main" id="{7A79A631-34B1-FCD7-4D47-7AAE0200848D}"/>
+              </a:ext>
+            </a:extLst>
+          </p:cNvPr>
+          <p:cNvSpPr>
+            <a:spLocks noGrp="1"/>
+          </p:cNvSpPr>
+          <p:nvPr>
+            <p:ph idx="1"/>
+          </p:nvPr>
+        </p:nvSpPr>
+        <p:spPr/>
+        <p:txBody>
+          <a:bodyPr/>
+          <a:lstStyle/>
+          <a:p>
+            <a:r>
+              <a:rPr lang="es-MX" dirty="0"/>
+              <a:t>Construcción modelo en capas UP - DOWN</a:t>
+            </a:r>
+          </a:p>
+        </p:txBody>
+      </p:sp>
+      <p:sp>
+        <p:nvSpPr>
+          <p:cNvPr id="4" name="Flecha: arriba y abajo 3">
+            <a:extLst>
+              <a:ext uri="{FF2B5EF4-FFF2-40B4-BE49-F238E27FC236}">
+                <a16:creationId xmlns:a16="http://schemas.microsoft.com/office/drawing/2014/main" id="{1F8968AE-7863-BB98-6AEF-FC7091694A38}"/>
+              </a:ext>
+            </a:extLst>
+          </p:cNvPr>
+          <p:cNvSpPr/>
+          <p:nvPr/>
+        </p:nvSpPr>
+        <p:spPr>
+          <a:xfrm>
+            <a:off x="993912" y="3273287"/>
+            <a:ext cx="516835" cy="2146852"/>
+          </a:xfrm>
+          <a:prstGeom prst="upDownArrow">
+            <a:avLst/>
+          </a:prstGeom>
+        </p:spPr>
+        <p:style>
+          <a:lnRef idx="2">
+            <a:schemeClr val="accent1">
+              <a:shade val="50000"/>
+            </a:schemeClr>
+          </a:lnRef>
+          <a:fillRef idx="1">
+            <a:schemeClr val="accent1"/>
+          </a:fillRef>
+          <a:effectRef idx="0">
+            <a:schemeClr val="accent1"/>
+          </a:effectRef>
+          <a:fontRef idx="minor">
+            <a:schemeClr val="lt1"/>
+          </a:fontRef>
+        </p:style>
+        <p:txBody>
+          <a:bodyPr rtlCol="0" anchor="ctr"/>
+          <a:lstStyle/>
+          <a:p>
+            <a:pPr algn="ctr"/>
+            <a:endParaRPr lang="es-MX"/>
+          </a:p>
+        </p:txBody>
+      </p:sp>
+      <p:sp>
+        <p:nvSpPr>
+          <p:cNvPr id="5" name="CuadroTexto 4">
+            <a:extLst>
+              <a:ext uri="{FF2B5EF4-FFF2-40B4-BE49-F238E27FC236}">
+                <a16:creationId xmlns:a16="http://schemas.microsoft.com/office/drawing/2014/main" id="{E91E21C0-EEB6-BF65-7008-57B4594D519A}"/>
+              </a:ext>
+            </a:extLst>
+          </p:cNvPr>
+          <p:cNvSpPr txBox="1"/>
+          <p:nvPr/>
+        </p:nvSpPr>
+        <p:spPr>
+          <a:xfrm>
+            <a:off x="2266122" y="2743200"/>
+            <a:ext cx="9087678" cy="1200329"/>
+          </a:xfrm>
+          <a:prstGeom prst="rect">
+            <a:avLst/>
+          </a:prstGeom>
+          <a:noFill/>
+        </p:spPr>
+        <p:txBody>
+          <a:bodyPr wrap="square" rtlCol="0">
+            <a:spAutoFit/>
+          </a:bodyPr>
+          <a:lstStyle/>
+          <a:p>
+            <a:r>
+              <a:rPr lang="es-MX" dirty="0"/>
+              <a:t>Vistas: es la respuesta del back en un formato </a:t>
+            </a:r>
+            <a:r>
+              <a:rPr lang="es-MX" dirty="0" err="1"/>
+              <a:t>json</a:t>
+            </a:r>
+            <a:r>
+              <a:rPr lang="es-MX" dirty="0"/>
+              <a:t>: código de respuesta 200 – 599, status: v/f </a:t>
+            </a:r>
+            <a:r>
+              <a:rPr lang="es-MX" dirty="0" err="1"/>
+              <a:t>bool</a:t>
+            </a:r>
+            <a:r>
+              <a:rPr lang="es-MX" dirty="0"/>
+              <a:t>, arreglo de mensajes, opcionalmente un arreglo de datos (control de las rutas) grupo de rutas para los catálogos: </a:t>
+            </a:r>
+            <a:r>
+              <a:rPr lang="es-MX" dirty="0" err="1"/>
+              <a:t>cat_contacto</a:t>
+            </a:r>
+            <a:r>
+              <a:rPr lang="es-MX" dirty="0"/>
+              <a:t>, </a:t>
+            </a:r>
+            <a:r>
+              <a:rPr lang="es-MX" dirty="0" err="1"/>
+              <a:t>cat_estado</a:t>
+            </a:r>
+            <a:r>
+              <a:rPr lang="es-MX" dirty="0"/>
+              <a:t>,  </a:t>
+            </a:r>
+            <a:r>
+              <a:rPr lang="es-MX" dirty="0" err="1"/>
+              <a:t>cat_municipio</a:t>
+            </a:r>
+            <a:r>
+              <a:rPr lang="es-MX" dirty="0"/>
+              <a:t>, </a:t>
+            </a:r>
+            <a:r>
+              <a:rPr lang="es-MX" dirty="0" err="1"/>
+              <a:t>cat_localidad</a:t>
+            </a:r>
+            <a:r>
+              <a:rPr lang="es-MX" dirty="0"/>
+              <a:t>, grupo de rutas empleado: crear, modificar, listar, eliminar (CRUD), CRUD empleado contacto</a:t>
+            </a:r>
+          </a:p>
+        </p:txBody>
+      </p:sp>
+      <p:sp>
+        <p:nvSpPr>
+          <p:cNvPr id="6" name="CuadroTexto 5">
+            <a:extLst>
+              <a:ext uri="{FF2B5EF4-FFF2-40B4-BE49-F238E27FC236}">
+                <a16:creationId xmlns:a16="http://schemas.microsoft.com/office/drawing/2014/main" id="{816FC095-BA34-9AC2-F805-A45C49991751}"/>
+              </a:ext>
+            </a:extLst>
+          </p:cNvPr>
+          <p:cNvSpPr txBox="1"/>
+          <p:nvPr/>
+        </p:nvSpPr>
+        <p:spPr>
+          <a:xfrm>
+            <a:off x="2266122" y="4227443"/>
+            <a:ext cx="9927526" cy="646331"/>
+          </a:xfrm>
+          <a:prstGeom prst="rect">
+            <a:avLst/>
+          </a:prstGeom>
+          <a:noFill/>
+        </p:spPr>
+        <p:txBody>
+          <a:bodyPr wrap="none" rtlCol="0">
+            <a:spAutoFit/>
+          </a:bodyPr>
+          <a:lstStyle/>
+          <a:p>
+            <a:r>
+              <a:rPr lang="es-MX" dirty="0"/>
+              <a:t>Controlador: delega lo que va a realizar el back, ir hacia una validación, ir hacia un modelo para procesar </a:t>
+            </a:r>
+          </a:p>
+          <a:p>
+            <a:r>
+              <a:rPr lang="es-MX" dirty="0"/>
+              <a:t>Información, formato de la información que recibe del FRONT </a:t>
+            </a:r>
+          </a:p>
+        </p:txBody>
+      </p:sp>
+      <p:sp>
+        <p:nvSpPr>
+          <p:cNvPr id="7" name="CuadroTexto 6">
+            <a:extLst>
+              <a:ext uri="{FF2B5EF4-FFF2-40B4-BE49-F238E27FC236}">
+                <a16:creationId xmlns:a16="http://schemas.microsoft.com/office/drawing/2014/main" id="{FE0BA467-2123-C3FA-76FC-B4AB0F2E595E}"/>
+              </a:ext>
+            </a:extLst>
+          </p:cNvPr>
+          <p:cNvSpPr txBox="1"/>
+          <p:nvPr/>
+        </p:nvSpPr>
+        <p:spPr>
+          <a:xfrm>
+            <a:off x="2266122" y="5235473"/>
+            <a:ext cx="3817648" cy="369332"/>
+          </a:xfrm>
+          <a:prstGeom prst="rect">
+            <a:avLst/>
+          </a:prstGeom>
+          <a:noFill/>
+        </p:spPr>
+        <p:txBody>
+          <a:bodyPr wrap="none" rtlCol="0">
+            <a:spAutoFit/>
+          </a:bodyPr>
+          <a:lstStyle/>
+          <a:p>
+            <a:r>
+              <a:rPr lang="es-MX" dirty="0"/>
+              <a:t>Modelo: persistencia y acceso de la BD</a:t>
+            </a:r>
+          </a:p>
+        </p:txBody>
+      </p:sp>
+      <p:sp>
+        <p:nvSpPr>
+          <p:cNvPr id="9" name="CuadroTexto 8">
+            <a:extLst>
+              <a:ext uri="{FF2B5EF4-FFF2-40B4-BE49-F238E27FC236}">
+                <a16:creationId xmlns:a16="http://schemas.microsoft.com/office/drawing/2014/main" id="{2A8CBDA3-BE8F-13B7-0651-6A229E3FDB04}"/>
+              </a:ext>
+            </a:extLst>
+          </p:cNvPr>
+          <p:cNvSpPr txBox="1"/>
+          <p:nvPr/>
+        </p:nvSpPr>
+        <p:spPr>
+          <a:xfrm>
+            <a:off x="2385391" y="6029739"/>
+            <a:ext cx="452368" cy="369332"/>
+          </a:xfrm>
+          <a:prstGeom prst="rect">
+            <a:avLst/>
+          </a:prstGeom>
+          <a:noFill/>
+        </p:spPr>
+        <p:txBody>
+          <a:bodyPr wrap="none" rtlCol="0">
+            <a:spAutoFit/>
+          </a:bodyPr>
+          <a:lstStyle/>
+          <a:p>
+            <a:r>
+              <a:rPr lang="es-MX" dirty="0"/>
+              <a:t>BD</a:t>
+            </a:r>
+          </a:p>
+        </p:txBody>
+      </p:sp>
+    </p:spTree>
+    <p:extLst>
+      <p:ext uri="{BB962C8B-B14F-4D97-AF65-F5344CB8AC3E}">
+        <p14:creationId xmlns:p14="http://schemas.microsoft.com/office/powerpoint/2010/main" val="2694810632"/>
+      </p:ext>
+    </p:extLst>
+  </p:cSld>
+  <p:clrMapOvr>
+    <a:masterClrMapping/>
+  </p:clrMapOvr>
+</p:sld>
+</file>
+
+<file path=ppt/slides/slide7.xml><?xml version="1.0" encoding="utf-8"?>
+<p:sld xmlns:a="http://schemas.openxmlformats.org/drawingml/2006/main" xmlns:r="http://schemas.openxmlformats.org/officeDocument/2006/relationships" xmlns:p="http://schemas.openxmlformats.org/presentationml/2006/main">
+  <p:cSld>
+    <p:spTree>
+      <p:nvGrpSpPr>
+        <p:cNvPr id="1" name=""/>
+        <p:cNvGrpSpPr/>
+        <p:nvPr/>
+      </p:nvGrpSpPr>
+      <p:grpSpPr>
+        <a:xfrm>
+          <a:off x="0" y="0"/>
+          <a:ext cx="0" cy="0"/>
+          <a:chOff x="0" y="0"/>
+          <a:chExt cx="0" cy="0"/>
+        </a:xfrm>
+      </p:grpSpPr>
+      <p:sp>
+        <p:nvSpPr>
+          <p:cNvPr id="2" name="Título 1">
+            <a:extLst>
+              <a:ext uri="{FF2B5EF4-FFF2-40B4-BE49-F238E27FC236}">
+                <a16:creationId xmlns:a16="http://schemas.microsoft.com/office/drawing/2014/main" id="{25800AC1-ED2F-D3DB-E553-6E83EAD87913}"/>
+              </a:ext>
+            </a:extLst>
+          </p:cNvPr>
+          <p:cNvSpPr>
+            <a:spLocks noGrp="1"/>
+          </p:cNvSpPr>
+          <p:nvPr>
+            <p:ph type="title"/>
+          </p:nvPr>
+        </p:nvSpPr>
+        <p:spPr/>
+        <p:txBody>
+          <a:bodyPr/>
+          <a:lstStyle/>
+          <a:p>
+            <a:r>
+              <a:rPr lang="es-MX" dirty="0"/>
+              <a:t>Dos tipos: compilados y los interpretados</a:t>
+            </a:r>
+          </a:p>
+        </p:txBody>
+      </p:sp>
+      <p:sp>
+        <p:nvSpPr>
+          <p:cNvPr id="3" name="Marcador de contenido 2">
+            <a:extLst>
+              <a:ext uri="{FF2B5EF4-FFF2-40B4-BE49-F238E27FC236}">
+                <a16:creationId xmlns:a16="http://schemas.microsoft.com/office/drawing/2014/main" id="{3BC9717D-0269-D1D6-B356-45F73DFA4606}"/>
+              </a:ext>
+            </a:extLst>
+          </p:cNvPr>
+          <p:cNvSpPr>
+            <a:spLocks noGrp="1"/>
+          </p:cNvSpPr>
+          <p:nvPr>
+            <p:ph idx="1"/>
+          </p:nvPr>
+        </p:nvSpPr>
+        <p:spPr/>
+        <p:txBody>
+          <a:bodyPr/>
+          <a:lstStyle/>
+          <a:p>
+            <a:r>
+              <a:rPr lang="es-MX" dirty="0" err="1"/>
+              <a:t>Lenjuages</a:t>
+            </a:r>
+            <a:r>
+              <a:rPr lang="es-MX" dirty="0"/>
+              <a:t> altamente tipado y bajamente tipado</a:t>
+            </a:r>
+          </a:p>
+          <a:p>
+            <a:r>
+              <a:rPr lang="es-MX" dirty="0" err="1"/>
+              <a:t>Int</a:t>
+            </a:r>
+            <a:r>
+              <a:rPr lang="es-MX" dirty="0"/>
+              <a:t>; </a:t>
+            </a:r>
+            <a:r>
+              <a:rPr lang="es-MX" dirty="0" err="1"/>
+              <a:t>float</a:t>
+            </a:r>
+            <a:r>
+              <a:rPr lang="es-MX" dirty="0"/>
+              <a:t>, </a:t>
+            </a:r>
+            <a:r>
+              <a:rPr lang="es-MX" dirty="0" err="1"/>
+              <a:t>boolean</a:t>
+            </a:r>
+            <a:r>
+              <a:rPr lang="es-MX" dirty="0"/>
+              <a:t>, </a:t>
+            </a:r>
+            <a:r>
+              <a:rPr lang="es-MX" dirty="0" err="1"/>
+              <a:t>char</a:t>
+            </a:r>
+            <a:r>
+              <a:rPr lang="es-MX" dirty="0"/>
+              <a:t>, </a:t>
+            </a:r>
+            <a:r>
+              <a:rPr lang="es-MX" dirty="0" err="1"/>
+              <a:t>long</a:t>
+            </a:r>
+            <a:r>
+              <a:rPr lang="es-MX" dirty="0"/>
+              <a:t>, short, </a:t>
+            </a:r>
+            <a:r>
+              <a:rPr lang="es-MX" dirty="0" err="1"/>
+              <a:t>double</a:t>
+            </a:r>
+            <a:r>
+              <a:rPr lang="es-MX" dirty="0"/>
+              <a:t>, byte</a:t>
+            </a:r>
+          </a:p>
+          <a:p>
+            <a:endParaRPr lang="es-MX" dirty="0"/>
+          </a:p>
+          <a:p>
+            <a:r>
+              <a:rPr lang="es-MX" dirty="0" err="1"/>
+              <a:t>String</a:t>
+            </a:r>
+            <a:r>
+              <a:rPr lang="es-MX" dirty="0"/>
+              <a:t>, </a:t>
+            </a:r>
+            <a:r>
+              <a:rPr lang="es-MX" dirty="0" err="1"/>
+              <a:t>Integer</a:t>
+            </a:r>
+            <a:r>
+              <a:rPr lang="es-MX" dirty="0"/>
+              <a:t>, </a:t>
+            </a:r>
+            <a:r>
+              <a:rPr lang="es-MX" dirty="0" err="1"/>
+              <a:t>Float</a:t>
+            </a:r>
+            <a:r>
+              <a:rPr lang="es-MX" dirty="0"/>
+              <a:t>, </a:t>
+            </a:r>
+            <a:r>
+              <a:rPr lang="es-MX" dirty="0" err="1"/>
+              <a:t>Double</a:t>
+            </a:r>
+            <a:endParaRPr lang="es-MX" dirty="0"/>
+          </a:p>
+        </p:txBody>
+      </p:sp>
+    </p:spTree>
+    <p:extLst>
+      <p:ext uri="{BB962C8B-B14F-4D97-AF65-F5344CB8AC3E}">
+        <p14:creationId xmlns:p14="http://schemas.microsoft.com/office/powerpoint/2010/main" val="3766475351"/>
+      </p:ext>
+    </p:extLst>
+  </p:cSld>
+  <p:clrMapOvr>
+    <a:masterClrMapping/>
+  </p:clrMapOvr>
+</p:sld>
+</file>
+
+<file path=ppt/slides/slide8.xml><?xml version="1.0" encoding="utf-8"?>
+<p:sld xmlns:a="http://schemas.openxmlformats.org/drawingml/2006/main" xmlns:r="http://schemas.openxmlformats.org/officeDocument/2006/relationships" xmlns:p="http://schemas.openxmlformats.org/presentationml/2006/main">
+  <p:cSld>
+    <p:spTree>
+      <p:nvGrpSpPr>
+        <p:cNvPr id="1" name=""/>
+        <p:cNvGrpSpPr/>
+        <p:nvPr/>
+      </p:nvGrpSpPr>
+      <p:grpSpPr>
+        <a:xfrm>
+          <a:off x="0" y="0"/>
+          <a:ext cx="0" cy="0"/>
+          <a:chOff x="0" y="0"/>
+          <a:chExt cx="0" cy="0"/>
+        </a:xfrm>
+      </p:grpSpPr>
+      <p:sp>
+        <p:nvSpPr>
+          <p:cNvPr id="2" name="Título 1">
+            <a:extLst>
+              <a:ext uri="{FF2B5EF4-FFF2-40B4-BE49-F238E27FC236}">
                 <a16:creationId xmlns:a16="http://schemas.microsoft.com/office/drawing/2014/main" id="{6BA4EFC6-9715-602C-2A93-797A412F0B6C}"/>
               </a:ext>
             </a:extLst>
@@ -5893,7 +6395,9 @@
         </p:nvSpPr>
         <p:spPr/>
         <p:txBody>
-          <a:bodyPr/>
+          <a:bodyPr>
+            <a:normAutofit lnSpcReduction="10000"/>
+          </a:bodyPr>
           <a:lstStyle/>
           <a:p>
             <a:r>
@@ -5953,14 +6457,41 @@
           </a:p>
           <a:p>
             <a:r>
-              <a:rPr lang="es-MX" dirty="0"/>
-              <a:t>Investigar funciones </a:t>
-            </a:r>
-            <a:r>
-              <a:rPr lang="es-MX"/>
-              <a:t>anonimas</a:t>
-            </a:r>
-            <a:endParaRPr lang="es-MX" dirty="0"/>
+              <a:rPr lang="es-MX" dirty="0">
+                <a:solidFill>
+                  <a:srgbClr val="FF0000"/>
+                </a:solidFill>
+              </a:rPr>
+              <a:t>Investigar funciones anónimas</a:t>
+            </a:r>
+          </a:p>
+          <a:p>
+            <a:r>
+              <a:rPr lang="es-MX" dirty="0"/>
+              <a:t>Investigar encapsulamiento de datos, puertos de comunicación</a:t>
+            </a:r>
+          </a:p>
+          <a:p>
+            <a:r>
+              <a:rPr lang="es-MX" dirty="0"/>
+              <a:t>Intentar crear el archivo </a:t>
+            </a:r>
+            <a:r>
+              <a:rPr lang="es-MX" dirty="0" err="1"/>
+              <a:t>CatContactoModelo</a:t>
+            </a:r>
+            <a:r>
+              <a:rPr lang="es-MX" dirty="0"/>
+              <a:t> que importe el archivo de </a:t>
+            </a:r>
+            <a:r>
+              <a:rPr lang="es-MX" dirty="0" err="1"/>
+              <a:t>BaseDeDatos</a:t>
+            </a:r>
+            <a:r>
+              <a:rPr lang="es-MX" dirty="0"/>
+              <a:t> y que realice la consulta de registros</a:t>
+            </a:r>
           </a:p>
         </p:txBody>
       </p:sp>

</xml_diff>

<commit_message>
cuarta sesion del curso de php puro ago 22
</commit_message>
<xml_diff>
--- a/presentacion/Presentación1.pptx
+++ b/presentacion/Presentación1.pptx
@@ -268,7 +268,7 @@
           <a:p>
             <a:fld id="{F1FFD307-C115-43E9-8A18-D57EFF9A5356}" type="datetimeFigureOut">
               <a:rPr lang="es-MX" smtClean="0"/>
-              <a:t>18/08/2022</a:t>
+              <a:t>19/08/2022</a:t>
             </a:fld>
             <a:endParaRPr lang="es-MX"/>
           </a:p>
@@ -468,7 +468,7 @@
           <a:p>
             <a:fld id="{F1FFD307-C115-43E9-8A18-D57EFF9A5356}" type="datetimeFigureOut">
               <a:rPr lang="es-MX" smtClean="0"/>
-              <a:t>18/08/2022</a:t>
+              <a:t>19/08/2022</a:t>
             </a:fld>
             <a:endParaRPr lang="es-MX"/>
           </a:p>
@@ -678,7 +678,7 @@
           <a:p>
             <a:fld id="{F1FFD307-C115-43E9-8A18-D57EFF9A5356}" type="datetimeFigureOut">
               <a:rPr lang="es-MX" smtClean="0"/>
-              <a:t>18/08/2022</a:t>
+              <a:t>19/08/2022</a:t>
             </a:fld>
             <a:endParaRPr lang="es-MX"/>
           </a:p>
@@ -878,7 +878,7 @@
           <a:p>
             <a:fld id="{F1FFD307-C115-43E9-8A18-D57EFF9A5356}" type="datetimeFigureOut">
               <a:rPr lang="es-MX" smtClean="0"/>
-              <a:t>18/08/2022</a:t>
+              <a:t>19/08/2022</a:t>
             </a:fld>
             <a:endParaRPr lang="es-MX"/>
           </a:p>
@@ -1154,7 +1154,7 @@
           <a:p>
             <a:fld id="{F1FFD307-C115-43E9-8A18-D57EFF9A5356}" type="datetimeFigureOut">
               <a:rPr lang="es-MX" smtClean="0"/>
-              <a:t>18/08/2022</a:t>
+              <a:t>19/08/2022</a:t>
             </a:fld>
             <a:endParaRPr lang="es-MX"/>
           </a:p>
@@ -1422,7 +1422,7 @@
           <a:p>
             <a:fld id="{F1FFD307-C115-43E9-8A18-D57EFF9A5356}" type="datetimeFigureOut">
               <a:rPr lang="es-MX" smtClean="0"/>
-              <a:t>18/08/2022</a:t>
+              <a:t>19/08/2022</a:t>
             </a:fld>
             <a:endParaRPr lang="es-MX"/>
           </a:p>
@@ -1837,7 +1837,7 @@
           <a:p>
             <a:fld id="{F1FFD307-C115-43E9-8A18-D57EFF9A5356}" type="datetimeFigureOut">
               <a:rPr lang="es-MX" smtClean="0"/>
-              <a:t>18/08/2022</a:t>
+              <a:t>19/08/2022</a:t>
             </a:fld>
             <a:endParaRPr lang="es-MX"/>
           </a:p>
@@ -1979,7 +1979,7 @@
           <a:p>
             <a:fld id="{F1FFD307-C115-43E9-8A18-D57EFF9A5356}" type="datetimeFigureOut">
               <a:rPr lang="es-MX" smtClean="0"/>
-              <a:t>18/08/2022</a:t>
+              <a:t>19/08/2022</a:t>
             </a:fld>
             <a:endParaRPr lang="es-MX"/>
           </a:p>
@@ -2092,7 +2092,7 @@
           <a:p>
             <a:fld id="{F1FFD307-C115-43E9-8A18-D57EFF9A5356}" type="datetimeFigureOut">
               <a:rPr lang="es-MX" smtClean="0"/>
-              <a:t>18/08/2022</a:t>
+              <a:t>19/08/2022</a:t>
             </a:fld>
             <a:endParaRPr lang="es-MX"/>
           </a:p>
@@ -2405,7 +2405,7 @@
           <a:p>
             <a:fld id="{F1FFD307-C115-43E9-8A18-D57EFF9A5356}" type="datetimeFigureOut">
               <a:rPr lang="es-MX" smtClean="0"/>
-              <a:t>18/08/2022</a:t>
+              <a:t>19/08/2022</a:t>
             </a:fld>
             <a:endParaRPr lang="es-MX"/>
           </a:p>
@@ -2694,7 +2694,7 @@
           <a:p>
             <a:fld id="{F1FFD307-C115-43E9-8A18-D57EFF9A5356}" type="datetimeFigureOut">
               <a:rPr lang="es-MX" smtClean="0"/>
-              <a:t>18/08/2022</a:t>
+              <a:t>19/08/2022</a:t>
             </a:fld>
             <a:endParaRPr lang="es-MX"/>
           </a:p>
@@ -2937,7 +2937,7 @@
           <a:p>
             <a:fld id="{F1FFD307-C115-43E9-8A18-D57EFF9A5356}" type="datetimeFigureOut">
               <a:rPr lang="es-MX" smtClean="0"/>
-              <a:t>18/08/2022</a:t>
+              <a:t>19/08/2022</a:t>
             </a:fld>
             <a:endParaRPr lang="es-MX"/>
           </a:p>
@@ -6396,7 +6396,7 @@
         <p:spPr/>
         <p:txBody>
           <a:bodyPr>
-            <a:normAutofit lnSpcReduction="10000"/>
+            <a:normAutofit fontScale="92500" lnSpcReduction="20000"/>
           </a:bodyPr>
           <a:lstStyle/>
           <a:p>
@@ -6467,30 +6467,68 @@
           </a:p>
           <a:p>
             <a:r>
-              <a:rPr lang="es-MX" dirty="0"/>
+              <a:rPr lang="es-MX" dirty="0">
+                <a:solidFill>
+                  <a:srgbClr val="FF0000"/>
+                </a:solidFill>
+              </a:rPr>
               <a:t>Investigar encapsulamiento de datos, puertos de comunicación</a:t>
             </a:r>
           </a:p>
           <a:p>
             <a:r>
-              <a:rPr lang="es-MX" dirty="0"/>
+              <a:rPr lang="es-MX" dirty="0">
+                <a:solidFill>
+                  <a:srgbClr val="FF0000"/>
+                </a:solidFill>
+              </a:rPr>
               <a:t>Intentar crear el archivo </a:t>
             </a:r>
             <a:r>
+              <a:rPr lang="es-MX" dirty="0" err="1">
+                <a:solidFill>
+                  <a:srgbClr val="FF0000"/>
+                </a:solidFill>
+              </a:rPr>
+              <a:t>CatContactoModelo</a:t>
+            </a:r>
+            <a:r>
+              <a:rPr lang="es-MX" dirty="0">
+                <a:solidFill>
+                  <a:srgbClr val="FF0000"/>
+                </a:solidFill>
+              </a:rPr>
+              <a:t> que importe el archivo de </a:t>
+            </a:r>
+            <a:r>
+              <a:rPr lang="es-MX" dirty="0" err="1">
+                <a:solidFill>
+                  <a:srgbClr val="FF0000"/>
+                </a:solidFill>
+              </a:rPr>
+              <a:t>BaseDeDatos</a:t>
+            </a:r>
+            <a:r>
+              <a:rPr lang="es-MX" dirty="0">
+                <a:solidFill>
+                  <a:srgbClr val="FF0000"/>
+                </a:solidFill>
+              </a:rPr>
+              <a:t> y que realice la consulta de registros</a:t>
+            </a:r>
+          </a:p>
+          <a:p>
+            <a:r>
+              <a:rPr lang="es-MX" dirty="0"/>
+              <a:t>Integrar el insertado de los datos del empleado con la query que se logro en la sesión 4 (y validar los cambios con un </a:t>
+            </a:r>
+            <a:r>
               <a:rPr lang="es-MX" dirty="0" err="1"/>
-              <a:t>CatContactoModelo</a:t>
-            </a:r>
-            <a:r>
-              <a:rPr lang="es-MX" dirty="0"/>
-              <a:t> que importe el archivo de </a:t>
-            </a:r>
-            <a:r>
-              <a:rPr lang="es-MX" dirty="0" err="1"/>
-              <a:t>BaseDeDatos</a:t>
-            </a:r>
-            <a:r>
-              <a:rPr lang="es-MX" dirty="0"/>
-              <a:t> y que realice la consulta de registros</a:t>
+              <a:t>insert</a:t>
+            </a:r>
+            <a:r>
+              <a:rPr lang="es-MX" dirty="0"/>
+              <a:t> del catalogo contacto)</a:t>
             </a:r>
           </a:p>
         </p:txBody>

</xml_diff>

<commit_message>
ultima capacitacion del curso de php puro ago 22
</commit_message>
<xml_diff>
--- a/presentacion/Presentación1.pptx
+++ b/presentacion/Presentación1.pptx
@@ -13,6 +13,7 @@
     <p:sldId id="262" r:id="rId7"/>
     <p:sldId id="263" r:id="rId8"/>
     <p:sldId id="258" r:id="rId9"/>
+    <p:sldId id="264" r:id="rId10"/>
   </p:sldIdLst>
   <p:sldSz cx="12192000" cy="6858000"/>
   <p:notesSz cx="6858000" cy="9144000"/>
@@ -268,7 +269,7 @@
           <a:p>
             <a:fld id="{F1FFD307-C115-43E9-8A18-D57EFF9A5356}" type="datetimeFigureOut">
               <a:rPr lang="es-MX" smtClean="0"/>
-              <a:t>19/08/2022</a:t>
+              <a:t>22/08/2022</a:t>
             </a:fld>
             <a:endParaRPr lang="es-MX"/>
           </a:p>
@@ -468,7 +469,7 @@
           <a:p>
             <a:fld id="{F1FFD307-C115-43E9-8A18-D57EFF9A5356}" type="datetimeFigureOut">
               <a:rPr lang="es-MX" smtClean="0"/>
-              <a:t>19/08/2022</a:t>
+              <a:t>22/08/2022</a:t>
             </a:fld>
             <a:endParaRPr lang="es-MX"/>
           </a:p>
@@ -678,7 +679,7 @@
           <a:p>
             <a:fld id="{F1FFD307-C115-43E9-8A18-D57EFF9A5356}" type="datetimeFigureOut">
               <a:rPr lang="es-MX" smtClean="0"/>
-              <a:t>19/08/2022</a:t>
+              <a:t>22/08/2022</a:t>
             </a:fld>
             <a:endParaRPr lang="es-MX"/>
           </a:p>
@@ -878,7 +879,7 @@
           <a:p>
             <a:fld id="{F1FFD307-C115-43E9-8A18-D57EFF9A5356}" type="datetimeFigureOut">
               <a:rPr lang="es-MX" smtClean="0"/>
-              <a:t>19/08/2022</a:t>
+              <a:t>22/08/2022</a:t>
             </a:fld>
             <a:endParaRPr lang="es-MX"/>
           </a:p>
@@ -1154,7 +1155,7 @@
           <a:p>
             <a:fld id="{F1FFD307-C115-43E9-8A18-D57EFF9A5356}" type="datetimeFigureOut">
               <a:rPr lang="es-MX" smtClean="0"/>
-              <a:t>19/08/2022</a:t>
+              <a:t>22/08/2022</a:t>
             </a:fld>
             <a:endParaRPr lang="es-MX"/>
           </a:p>
@@ -1422,7 +1423,7 @@
           <a:p>
             <a:fld id="{F1FFD307-C115-43E9-8A18-D57EFF9A5356}" type="datetimeFigureOut">
               <a:rPr lang="es-MX" smtClean="0"/>
-              <a:t>19/08/2022</a:t>
+              <a:t>22/08/2022</a:t>
             </a:fld>
             <a:endParaRPr lang="es-MX"/>
           </a:p>
@@ -1837,7 +1838,7 @@
           <a:p>
             <a:fld id="{F1FFD307-C115-43E9-8A18-D57EFF9A5356}" type="datetimeFigureOut">
               <a:rPr lang="es-MX" smtClean="0"/>
-              <a:t>19/08/2022</a:t>
+              <a:t>22/08/2022</a:t>
             </a:fld>
             <a:endParaRPr lang="es-MX"/>
           </a:p>
@@ -1979,7 +1980,7 @@
           <a:p>
             <a:fld id="{F1FFD307-C115-43E9-8A18-D57EFF9A5356}" type="datetimeFigureOut">
               <a:rPr lang="es-MX" smtClean="0"/>
-              <a:t>19/08/2022</a:t>
+              <a:t>22/08/2022</a:t>
             </a:fld>
             <a:endParaRPr lang="es-MX"/>
           </a:p>
@@ -2092,7 +2093,7 @@
           <a:p>
             <a:fld id="{F1FFD307-C115-43E9-8A18-D57EFF9A5356}" type="datetimeFigureOut">
               <a:rPr lang="es-MX" smtClean="0"/>
-              <a:t>19/08/2022</a:t>
+              <a:t>22/08/2022</a:t>
             </a:fld>
             <a:endParaRPr lang="es-MX"/>
           </a:p>
@@ -2405,7 +2406,7 @@
           <a:p>
             <a:fld id="{F1FFD307-C115-43E9-8A18-D57EFF9A5356}" type="datetimeFigureOut">
               <a:rPr lang="es-MX" smtClean="0"/>
-              <a:t>19/08/2022</a:t>
+              <a:t>22/08/2022</a:t>
             </a:fld>
             <a:endParaRPr lang="es-MX"/>
           </a:p>
@@ -2694,7 +2695,7 @@
           <a:p>
             <a:fld id="{F1FFD307-C115-43E9-8A18-D57EFF9A5356}" type="datetimeFigureOut">
               <a:rPr lang="es-MX" smtClean="0"/>
-              <a:t>19/08/2022</a:t>
+              <a:t>22/08/2022</a:t>
             </a:fld>
             <a:endParaRPr lang="es-MX"/>
           </a:p>
@@ -2937,7 +2938,7 @@
           <a:p>
             <a:fld id="{F1FFD307-C115-43E9-8A18-D57EFF9A5356}" type="datetimeFigureOut">
               <a:rPr lang="es-MX" smtClean="0"/>
-              <a:t>19/08/2022</a:t>
+              <a:t>22/08/2022</a:t>
             </a:fld>
             <a:endParaRPr lang="es-MX"/>
           </a:p>
@@ -3857,14 +3858,14 @@
           <p:nvPr>
             <p:extLst>
               <p:ext uri="{D42A27DB-BD31-4B8C-83A1-F6EECF244321}">
-                <p14:modId xmlns:p14="http://schemas.microsoft.com/office/powerpoint/2010/main" val="689851420"/>
+                <p14:modId xmlns:p14="http://schemas.microsoft.com/office/powerpoint/2010/main" val="3760933775"/>
               </p:ext>
             </p:extLst>
           </p:nvPr>
         </p:nvGraphicFramePr>
         <p:xfrm>
           <a:off x="1197114" y="3118310"/>
-          <a:ext cx="9961215" cy="2936240"/>
+          <a:ext cx="9961215" cy="3759200"/>
         </p:xfrm>
         <a:graphic>
           <a:graphicData uri="http://schemas.openxmlformats.org/drawingml/2006/table">
@@ -4032,7 +4033,7 @@
                     <a:p>
                       <a:r>
                         <a:rPr lang="es-MX" dirty="0"/>
-                        <a:t>* 246 107 19 77</a:t>
+                        <a:t>* celular: 246 107 19 77</a:t>
                       </a:r>
                     </a:p>
                   </a:txBody>
@@ -4060,6 +4061,16 @@
                       <a:r>
                         <a:rPr lang="es-MX" dirty="0"/>
                         <a:t>Eliminar</a:t>
+                      </a:r>
+                    </a:p>
+                    <a:p>
+                      <a:pPr marL="285750" indent="-285750">
+                        <a:buFont typeface="Arial" panose="020B0604020202020204" pitchFamily="34" charset="0"/>
+                        <a:buChar char="•"/>
+                      </a:pPr>
+                      <a:r>
+                        <a:rPr lang="es-MX" dirty="0"/>
+                        <a:t>Datos contacto</a:t>
                       </a:r>
                     </a:p>
                   </a:txBody>
@@ -4132,7 +4143,7 @@
                       </a:pPr>
                       <a:r>
                         <a:rPr lang="es-MX" dirty="0"/>
-                        <a:t>samantha@hotmail.com</a:t>
+                        <a:t>Correo: samantha@hotmail.com</a:t>
                       </a:r>
                     </a:p>
                   </a:txBody>
@@ -4159,7 +4170,17 @@
                       </a:pPr>
                       <a:r>
                         <a:rPr lang="es-MX" dirty="0"/>
-                        <a:t>eliminar</a:t>
+                        <a:t>Eliminar</a:t>
+                      </a:r>
+                    </a:p>
+                    <a:p>
+                      <a:pPr marL="285750" indent="-285750">
+                        <a:buFont typeface="Arial" panose="020B0604020202020204" pitchFamily="34" charset="0"/>
+                        <a:buChar char="•"/>
+                      </a:pPr>
+                      <a:r>
+                        <a:rPr lang="es-MX" dirty="0"/>
+                        <a:t>Datos contacto</a:t>
                       </a:r>
                     </a:p>
                   </a:txBody>
@@ -4246,6 +4267,16 @@
                       <a:r>
                         <a:rPr lang="es-MX" dirty="0"/>
                         <a:t>Eliminar</a:t>
+                      </a:r>
+                    </a:p>
+                    <a:p>
+                      <a:pPr marL="285750" indent="-285750">
+                        <a:buFont typeface="Arial" panose="020B0604020202020204" pitchFamily="34" charset="0"/>
+                        <a:buChar char="•"/>
+                      </a:pPr>
+                      <a:r>
+                        <a:rPr lang="es-MX" dirty="0"/>
+                        <a:t>Datos contacto</a:t>
                       </a:r>
                     </a:p>
                   </a:txBody>
@@ -6537,6 +6568,191 @@
     <p:extLst>
       <p:ext uri="{BB962C8B-B14F-4D97-AF65-F5344CB8AC3E}">
         <p14:creationId xmlns:p14="http://schemas.microsoft.com/office/powerpoint/2010/main" val="1129364451"/>
+      </p:ext>
+    </p:extLst>
+  </p:cSld>
+  <p:clrMapOvr>
+    <a:masterClrMapping/>
+  </p:clrMapOvr>
+</p:sld>
+</file>
+
+<file path=ppt/slides/slide9.xml><?xml version="1.0" encoding="utf-8"?>
+<p:sld xmlns:a="http://schemas.openxmlformats.org/drawingml/2006/main" xmlns:r="http://schemas.openxmlformats.org/officeDocument/2006/relationships" xmlns:p="http://schemas.openxmlformats.org/presentationml/2006/main">
+  <p:cSld>
+    <p:spTree>
+      <p:nvGrpSpPr>
+        <p:cNvPr id="1" name=""/>
+        <p:cNvGrpSpPr/>
+        <p:nvPr/>
+      </p:nvGrpSpPr>
+      <p:grpSpPr>
+        <a:xfrm>
+          <a:off x="0" y="0"/>
+          <a:ext cx="0" cy="0"/>
+          <a:chOff x="0" y="0"/>
+          <a:chExt cx="0" cy="0"/>
+        </a:xfrm>
+      </p:grpSpPr>
+      <p:sp>
+        <p:nvSpPr>
+          <p:cNvPr id="2" name="Título 1">
+            <a:extLst>
+              <a:ext uri="{FF2B5EF4-FFF2-40B4-BE49-F238E27FC236}">
+                <a16:creationId xmlns:a16="http://schemas.microsoft.com/office/drawing/2014/main" id="{49BCB4DE-A4DD-A625-52EB-6929DF248913}"/>
+              </a:ext>
+            </a:extLst>
+          </p:cNvPr>
+          <p:cNvSpPr>
+            <a:spLocks noGrp="1"/>
+          </p:cNvSpPr>
+          <p:nvPr>
+            <p:ph type="title"/>
+          </p:nvPr>
+        </p:nvSpPr>
+        <p:spPr/>
+        <p:txBody>
+          <a:bodyPr/>
+          <a:lstStyle/>
+          <a:p>
+            <a:r>
+              <a:rPr lang="es-ES" dirty="0"/>
+              <a:t>Proyecto final</a:t>
+            </a:r>
+            <a:endParaRPr lang="es-MX" dirty="0"/>
+          </a:p>
+        </p:txBody>
+      </p:sp>
+      <p:sp>
+        <p:nvSpPr>
+          <p:cNvPr id="3" name="Marcador de contenido 2">
+            <a:extLst>
+              <a:ext uri="{FF2B5EF4-FFF2-40B4-BE49-F238E27FC236}">
+                <a16:creationId xmlns:a16="http://schemas.microsoft.com/office/drawing/2014/main" id="{2D850EAD-8BED-F650-A90D-6C350362CFA7}"/>
+              </a:ext>
+            </a:extLst>
+          </p:cNvPr>
+          <p:cNvSpPr>
+            <a:spLocks noGrp="1"/>
+          </p:cNvSpPr>
+          <p:nvPr>
+            <p:ph idx="1"/>
+          </p:nvPr>
+        </p:nvSpPr>
+        <p:spPr/>
+        <p:txBody>
+          <a:bodyPr>
+            <a:normAutofit fontScale="85000" lnSpcReduction="20000"/>
+          </a:bodyPr>
+          <a:lstStyle/>
+          <a:p>
+            <a:r>
+              <a:rPr lang="es-ES" dirty="0"/>
+              <a:t>Validar datos conforme a caracteres especiales</a:t>
+            </a:r>
+          </a:p>
+          <a:p>
+            <a:r>
+              <a:rPr lang="es-ES" dirty="0"/>
+              <a:t>Integren con base a lo que hemos visto las funciones de actualizar</a:t>
+            </a:r>
+            <a:r>
+              <a:rPr lang="es-MX" dirty="0"/>
+              <a:t> y eliminar empleado</a:t>
+            </a:r>
+          </a:p>
+          <a:p>
+            <a:r>
+              <a:rPr lang="es-MX" dirty="0"/>
+              <a:t>Integren el registrar los datos de contacto conforme a un empleado</a:t>
+            </a:r>
+            <a:r>
+              <a:rPr lang="es-ES" dirty="0"/>
+              <a:t> CRUD</a:t>
+            </a:r>
+          </a:p>
+          <a:p>
+            <a:r>
+              <a:rPr lang="es-ES" dirty="0"/>
+              <a:t>Actualizar el API del back de listado de empleados para que devuelva el listado de datos de contacto y opcionalmente que tenga el </a:t>
+            </a:r>
+            <a:r>
+              <a:rPr lang="es-ES" dirty="0" err="1"/>
+              <a:t>join</a:t>
+            </a:r>
+            <a:r>
+              <a:rPr lang="es-ES" dirty="0"/>
+              <a:t> con el catalogo para mostrarlo en el tablero</a:t>
+            </a:r>
+          </a:p>
+          <a:p>
+            <a:r>
+              <a:rPr lang="es-ES" dirty="0"/>
+              <a:t>Revisar algún proyecto del </a:t>
+            </a:r>
+            <a:r>
+              <a:rPr lang="es-ES" dirty="0" err="1"/>
+              <a:t>git</a:t>
+            </a:r>
+            <a:r>
+              <a:rPr lang="es-ES" dirty="0"/>
+              <a:t> </a:t>
+            </a:r>
+            <a:r>
+              <a:rPr lang="es-ES" dirty="0" err="1"/>
+              <a:t>hub</a:t>
+            </a:r>
+            <a:r>
+              <a:rPr lang="es-ES" dirty="0"/>
+              <a:t> de enriquecr1990 para resolver dudas de los puntos anteriores (ingeniería inversa)</a:t>
+            </a:r>
+          </a:p>
+          <a:p>
+            <a:r>
+              <a:rPr lang="es-ES" dirty="0"/>
+              <a:t>De ser posible subir su proyecto en </a:t>
+            </a:r>
+            <a:r>
+              <a:rPr lang="es-ES"/>
+              <a:t>github</a:t>
+            </a:r>
+            <a:endParaRPr lang="es-ES" dirty="0"/>
+          </a:p>
+          <a:p>
+            <a:r>
+              <a:rPr lang="es-ES" dirty="0"/>
+              <a:t>PLUS: subirlo a un hosting gratuito (000webhost) </a:t>
+            </a:r>
+          </a:p>
+          <a:p>
+            <a:r>
+              <a:rPr lang="es-ES" dirty="0"/>
+              <a:t>Codificar </a:t>
+            </a:r>
+            <a:r>
+              <a:rPr lang="es-ES" dirty="0" err="1"/>
+              <a:t>json</a:t>
+            </a:r>
+            <a:r>
+              <a:rPr lang="es-ES" dirty="0"/>
+              <a:t> en JS, eliminar renglones de tablas con </a:t>
+            </a:r>
+            <a:r>
+              <a:rPr lang="es-ES" dirty="0" err="1"/>
+              <a:t>js</a:t>
+            </a:r>
+            <a:r>
+              <a:rPr lang="es-ES" dirty="0"/>
+              <a:t>, actualizar inputs de formulario con JS</a:t>
+            </a:r>
+            <a:endParaRPr lang="es-MX" dirty="0"/>
+          </a:p>
+        </p:txBody>
+      </p:sp>
+    </p:spTree>
+    <p:extLst>
+      <p:ext uri="{BB962C8B-B14F-4D97-AF65-F5344CB8AC3E}">
+        <p14:creationId xmlns:p14="http://schemas.microsoft.com/office/powerpoint/2010/main" val="3552033736"/>
       </p:ext>
     </p:extLst>
   </p:cSld>

</xml_diff>